<commit_message>
fixed spring break dates
</commit_message>
<xml_diff>
--- a/courses/ese6050-spring2025/lecture-slides/logistics.pptx
+++ b/courses/ese6050-spring2025/lecture-slides/logistics.pptx
@@ -6198,7 +6198,7 @@
         <p:spPr>
           <a:xfrm>
             <a:off x="310448" y="786357"/>
-            <a:ext cx="8660831" cy="3293209"/>
+            <a:ext cx="8660831" cy="4031873"/>
           </a:xfrm>
           <a:prstGeom prst="rect">
             <a:avLst/>
@@ -6348,6 +6348,35 @@
             <a:r>
               <a:rPr lang="en-US" sz="1600" dirty="0"/>
               <a:t>NM after class on Tuesday, remaining TAs will be posted on Canvas. Please let us know if you are unable to make it to any of these due to conflicts.</a:t>
+            </a:r>
+          </a:p>
+          <a:p>
+            <a:pPr marL="285750" indent="-285750">
+              <a:buFont typeface="Arial" panose="020B0604020202020204" pitchFamily="34" charset="0"/>
+              <a:buChar char="•"/>
+            </a:pPr>
+            <a:endParaRPr lang="en-US" sz="1600" b="1" dirty="0"/>
+          </a:p>
+          <a:p>
+            <a:pPr marL="285750" indent="-285750">
+              <a:buFont typeface="Arial" panose="020B0604020202020204" pitchFamily="34" charset="0"/>
+              <a:buChar char="•"/>
+            </a:pPr>
+            <a:r>
+              <a:rPr lang="en-US" sz="1600" b="1" dirty="0"/>
+              <a:t>If you are trying to register: you need to join the waitlist on </a:t>
+            </a:r>
+            <a:r>
+              <a:rPr lang="en-US" sz="1600" b="1" dirty="0" err="1"/>
+              <a:t>Path@Penn</a:t>
+            </a:r>
+            <a:r>
+              <a:rPr lang="en-US" sz="1600" b="1" dirty="0"/>
+              <a:t> and fill out the Google form on the ESE website.  We are currently at capacity, </a:t>
+            </a:r>
+            <a:r>
+              <a:rPr lang="en-US" sz="1600" b="1"/>
+              <a:t>but spots may open up.</a:t>
             </a:r>
             <a:endParaRPr lang="en-US" sz="1600" b="1" dirty="0"/>
           </a:p>
@@ -6737,6 +6766,67 @@
                       </p:childTnLst>
                     </p:cTn>
                   </p:par>
+                  <p:par>
+                    <p:cTn id="33" fill="hold">
+                      <p:stCondLst>
+                        <p:cond delay="indefinite"/>
+                      </p:stCondLst>
+                      <p:childTnLst>
+                        <p:par>
+                          <p:cTn id="34" fill="hold">
+                            <p:stCondLst>
+                              <p:cond delay="0"/>
+                            </p:stCondLst>
+                            <p:childTnLst>
+                              <p:par>
+                                <p:cTn id="35" presetID="9" presetClass="entr" presetSubtype="0" fill="hold" nodeType="clickEffect">
+                                  <p:stCondLst>
+                                    <p:cond delay="0"/>
+                                  </p:stCondLst>
+                                  <p:childTnLst>
+                                    <p:set>
+                                      <p:cBhvr>
+                                        <p:cTn id="36" dur="1" fill="hold">
+                                          <p:stCondLst>
+                                            <p:cond delay="0"/>
+                                          </p:stCondLst>
+                                        </p:cTn>
+                                        <p:tgtEl>
+                                          <p:spTgt spid="29">
+                                            <p:txEl>
+                                              <p:pRg st="12" end="12"/>
+                                            </p:txEl>
+                                          </p:spTgt>
+                                        </p:tgtEl>
+                                        <p:attrNameLst>
+                                          <p:attrName>style.visibility</p:attrName>
+                                        </p:attrNameLst>
+                                      </p:cBhvr>
+                                      <p:to>
+                                        <p:strVal val="visible"/>
+                                      </p:to>
+                                    </p:set>
+                                    <p:animEffect transition="in" filter="dissolve">
+                                      <p:cBhvr>
+                                        <p:cTn id="37" dur="500"/>
+                                        <p:tgtEl>
+                                          <p:spTgt spid="29">
+                                            <p:txEl>
+                                              <p:pRg st="12" end="12"/>
+                                            </p:txEl>
+                                          </p:spTgt>
+                                        </p:tgtEl>
+                                      </p:cBhvr>
+                                    </p:animEffect>
+                                  </p:childTnLst>
+                                </p:cTn>
+                              </p:par>
+                            </p:childTnLst>
+                          </p:cTn>
+                        </p:par>
+                      </p:childTnLst>
+                    </p:cTn>
+                  </p:par>
                 </p:childTnLst>
               </p:cTn>
               <p:prevCondLst>
@@ -7859,11 +7949,7 @@
             </a:r>
             <a:r>
               <a:rPr lang="en-US" b="1" dirty="0"/>
-              <a:t>  We reserve the right to request to see your original handwritten notes </a:t>
-            </a:r>
-            <a:r>
-              <a:rPr lang="en-US" b="1"/>
-              <a:t>in this case.</a:t>
+              <a:t>  We reserve the right to request to see your original handwritten notes in this case.</a:t>
             </a:r>
             <a:endParaRPr lang="en-US" dirty="0"/>
           </a:p>

</xml_diff>